<commit_message>
Updated template PPTX logo
</commit_message>
<xml_diff>
--- a/template.pptx
+++ b/template.pptx
@@ -1488,6 +1488,7 @@
           <c:dLbls>
             <c:dLbl>
               <c:idx val="0"/>
+              <c:layout/>
               <c:tx>
                 <c:rich>
                   <a:bodyPr/>
@@ -1521,6 +1522,7 @@
 </c:separator>
               <c:extLst>
                 <c:ext xmlns:c15="http://schemas.microsoft.com/office/drawing/2012/chart" uri="{CE6537A1-D6FC-4f65-9D91-7224C49458BB}">
+                  <c15:layout/>
                   <c15:dlblFieldTable/>
                   <c15:showDataLabelsRange val="1"/>
                 </c:ext>
@@ -1528,6 +1530,7 @@
             </c:dLbl>
             <c:dLbl>
               <c:idx val="1"/>
+              <c:layout/>
               <c:tx>
                 <c:rich>
                   <a:bodyPr/>
@@ -1561,6 +1564,7 @@
 </c:separator>
               <c:extLst>
                 <c:ext xmlns:c15="http://schemas.microsoft.com/office/drawing/2012/chart" uri="{CE6537A1-D6FC-4f65-9D91-7224C49458BB}">
+                  <c15:layout/>
                   <c15:dlblFieldTable/>
                   <c15:showDataLabelsRange val="1"/>
                 </c:ext>
@@ -1568,6 +1572,7 @@
             </c:dLbl>
             <c:dLbl>
               <c:idx val="2"/>
+              <c:layout/>
               <c:tx>
                 <c:rich>
                   <a:bodyPr/>
@@ -1601,6 +1606,7 @@
 </c:separator>
               <c:extLst>
                 <c:ext xmlns:c15="http://schemas.microsoft.com/office/drawing/2012/chart" uri="{CE6537A1-D6FC-4f65-9D91-7224C49458BB}">
+                  <c15:layout/>
                   <c15:dlblFieldTable/>
                   <c15:showDataLabelsRange val="1"/>
                 </c:ext>
@@ -1608,6 +1614,7 @@
             </c:dLbl>
             <c:dLbl>
               <c:idx val="3"/>
+              <c:layout/>
               <c:tx>
                 <c:rich>
                   <a:bodyPr/>
@@ -1641,6 +1648,7 @@
 </c:separator>
               <c:extLst>
                 <c:ext xmlns:c15="http://schemas.microsoft.com/office/drawing/2012/chart" uri="{CE6537A1-D6FC-4f65-9D91-7224C49458BB}">
+                  <c15:layout/>
                   <c15:dlblFieldTable/>
                   <c15:showDataLabelsRange val="1"/>
                 </c:ext>
@@ -1648,6 +1656,7 @@
             </c:dLbl>
             <c:dLbl>
               <c:idx val="4"/>
+              <c:layout/>
               <c:tx>
                 <c:rich>
                   <a:bodyPr/>
@@ -1681,6 +1690,7 @@
 </c:separator>
               <c:extLst>
                 <c:ext xmlns:c15="http://schemas.microsoft.com/office/drawing/2012/chart" uri="{CE6537A1-D6FC-4f65-9D91-7224C49458BB}">
+                  <c15:layout/>
                   <c15:dlblFieldTable/>
                   <c15:showDataLabelsRange val="1"/>
                 </c:ext>
@@ -1688,6 +1698,7 @@
             </c:dLbl>
             <c:dLbl>
               <c:idx val="5"/>
+              <c:layout/>
               <c:tx>
                 <c:rich>
                   <a:bodyPr/>
@@ -1721,6 +1732,7 @@
 </c:separator>
               <c:extLst>
                 <c:ext xmlns:c15="http://schemas.microsoft.com/office/drawing/2012/chart" uri="{CE6537A1-D6FC-4f65-9D91-7224C49458BB}">
+                  <c15:layout/>
                   <c15:dlblFieldTable/>
                   <c15:showDataLabelsRange val="1"/>
                 </c:ext>
@@ -1728,6 +1740,7 @@
             </c:dLbl>
             <c:dLbl>
               <c:idx val="6"/>
+              <c:layout/>
               <c:tx>
                 <c:rich>
                   <a:bodyPr/>
@@ -1761,6 +1774,7 @@
 </c:separator>
               <c:extLst>
                 <c:ext xmlns:c15="http://schemas.microsoft.com/office/drawing/2012/chart" uri="{CE6537A1-D6FC-4f65-9D91-7224C49458BB}">
+                  <c15:layout/>
                   <c15:dlblFieldTable/>
                   <c15:showDataLabelsRange val="1"/>
                 </c:ext>
@@ -1928,11 +1942,11 @@
         </c:dLbls>
         <c:gapWidth val="219"/>
         <c:overlap val="-27"/>
-        <c:axId val="387371360"/>
-        <c:axId val="387136320"/>
+        <c:axId val="384169312"/>
+        <c:axId val="384169704"/>
       </c:barChart>
       <c:catAx>
-        <c:axId val="387371360"/>
+        <c:axId val="384169312"/>
         <c:scaling>
           <c:orientation val="minMax"/>
         </c:scaling>
@@ -1975,7 +1989,7 @@
             <a:endParaRPr lang="en-US"/>
           </a:p>
         </c:txPr>
-        <c:crossAx val="387136320"/>
+        <c:crossAx val="384169704"/>
         <c:crosses val="autoZero"/>
         <c:auto val="1"/>
         <c:lblAlgn val="ctr"/>
@@ -1983,7 +1997,7 @@
         <c:noMultiLvlLbl val="0"/>
       </c:catAx>
       <c:valAx>
-        <c:axId val="387136320"/>
+        <c:axId val="384169704"/>
         <c:scaling>
           <c:orientation val="minMax"/>
         </c:scaling>
@@ -1993,7 +2007,7 @@
         <c:majorTickMark val="none"/>
         <c:minorTickMark val="none"/>
         <c:tickLblPos val="nextTo"/>
-        <c:crossAx val="387371360"/>
+        <c:crossAx val="384169312"/>
         <c:crosses val="autoZero"/>
         <c:crossBetween val="between"/>
       </c:valAx>
@@ -2116,6 +2130,7 @@
             <c:showLeaderLines val="0"/>
             <c:extLst>
               <c:ext xmlns:c15="http://schemas.microsoft.com/office/drawing/2012/chart" uri="{CE6537A1-D6FC-4f65-9D91-7224C49458BB}">
+                <c15:layout/>
                 <c15:showLeaderLines val="1"/>
                 <c15:leaderLines>
                   <c:spPr>
@@ -2227,6 +2242,7 @@
             <c:showLeaderLines val="0"/>
             <c:extLst>
               <c:ext xmlns:c15="http://schemas.microsoft.com/office/drawing/2012/chart" uri="{CE6537A1-D6FC-4f65-9D91-7224C49458BB}">
+                <c15:layout/>
                 <c15:showLeaderLines val="1"/>
                 <c15:leaderLines>
                   <c:spPr>
@@ -2338,6 +2354,7 @@
             <c:showLeaderLines val="0"/>
             <c:extLst>
               <c:ext xmlns:c15="http://schemas.microsoft.com/office/drawing/2012/chart" uri="{CE6537A1-D6FC-4f65-9D91-7224C49458BB}">
+                <c15:layout/>
                 <c15:showLeaderLines val="1"/>
                 <c15:leaderLines>
                   <c:spPr>
@@ -2396,8 +2413,8 @@
         </c:dLbls>
         <c:gapWidth val="100"/>
         <c:overlap val="100"/>
-        <c:axId val="387137104"/>
-        <c:axId val="387137496"/>
+        <c:axId val="384170488"/>
+        <c:axId val="384170880"/>
       </c:barChart>
       <c:scatterChart>
         <c:scatterStyle val="lineMarker"/>
@@ -2432,6 +2449,7 @@
           <c:dLbls>
             <c:dLbl>
               <c:idx val="0"/>
+              <c:layout/>
               <c:tx>
                 <c:rich>
                   <a:bodyPr/>
@@ -2455,6 +2473,7 @@
               <c:showBubbleSize val="0"/>
               <c:extLst>
                 <c:ext xmlns:c15="http://schemas.microsoft.com/office/drawing/2012/chart" uri="{CE6537A1-D6FC-4f65-9D91-7224C49458BB}">
+                  <c15:layout/>
                   <c15:dlblFieldTable/>
                   <c15:showDataLabelsRange val="1"/>
                 </c:ext>
@@ -2467,7 +2486,7 @@
                   <a:bodyPr/>
                   <a:lstStyle/>
                   <a:p>
-                    <a:fld id="{FBD4D59B-BA4C-4ABB-831E-D7D5AA5FF025}" type="CELLRANGE">
+                    <a:fld id="{B80DF109-0D96-43D2-9049-1FDAB7B37BEF}" type="CELLRANGE">
                       <a:rPr lang="en-GB"/>
                       <a:pPr/>
                       <a:t>[CELLRANGE]</a:t>
@@ -2492,12 +2511,13 @@
             </c:dLbl>
             <c:dLbl>
               <c:idx val="2"/>
+              <c:layout/>
               <c:tx>
                 <c:rich>
                   <a:bodyPr/>
                   <a:lstStyle/>
                   <a:p>
-                    <a:fld id="{FA130CB1-B3F8-47F6-96E7-C49A7B42C567}" type="CELLRANGE">
+                    <a:fld id="{24F6EB32-B761-455B-802A-65E2DAC1FC03}" type="CELLRANGE">
                       <a:rPr lang="en-GB"/>
                       <a:pPr/>
                       <a:t>[CELLRANGE]</a:t>
@@ -2515,6 +2535,7 @@
               <c:showBubbleSize val="0"/>
               <c:extLst>
                 <c:ext xmlns:c15="http://schemas.microsoft.com/office/drawing/2012/chart" uri="{CE6537A1-D6FC-4f65-9D91-7224C49458BB}">
+                  <c15:layout/>
                   <c15:dlblFieldTable/>
                   <c15:xForSave val="1"/>
                   <c15:showDataLabelsRange val="1"/>
@@ -2523,12 +2544,13 @@
             </c:dLbl>
             <c:dLbl>
               <c:idx val="3"/>
+              <c:layout/>
               <c:tx>
                 <c:rich>
                   <a:bodyPr/>
                   <a:lstStyle/>
                   <a:p>
-                    <a:fld id="{CD361A22-AF37-4D26-93DF-6A05E7533A00}" type="CELLRANGE">
+                    <a:fld id="{ED70AF6B-EBD6-4336-A116-7C6014DBF0C5}" type="CELLRANGE">
                       <a:rPr lang="en-GB"/>
                       <a:pPr/>
                       <a:t>[CELLRANGE]</a:t>
@@ -2546,6 +2568,7 @@
               <c:showBubbleSize val="0"/>
               <c:extLst>
                 <c:ext xmlns:c15="http://schemas.microsoft.com/office/drawing/2012/chart" uri="{CE6537A1-D6FC-4f65-9D91-7224C49458BB}">
+                  <c15:layout/>
                   <c15:dlblFieldTable/>
                   <c15:xForSave val="1"/>
                   <c15:showDataLabelsRange val="1"/>
@@ -2554,12 +2577,13 @@
             </c:dLbl>
             <c:dLbl>
               <c:idx val="4"/>
+              <c:layout/>
               <c:tx>
                 <c:rich>
                   <a:bodyPr/>
                   <a:lstStyle/>
                   <a:p>
-                    <a:fld id="{22B5DD45-0BA4-4DA7-837B-3BBBE45C420D}" type="CELLRANGE">
+                    <a:fld id="{6FC269BA-BA02-4F82-93DA-11BA9457A7AB}" type="CELLRANGE">
                       <a:rPr lang="en-GB"/>
                       <a:pPr/>
                       <a:t>[CELLRANGE]</a:t>
@@ -2577,6 +2601,7 @@
               <c:showBubbleSize val="0"/>
               <c:extLst>
                 <c:ext xmlns:c15="http://schemas.microsoft.com/office/drawing/2012/chart" uri="{CE6537A1-D6FC-4f65-9D91-7224C49458BB}">
+                  <c15:layout/>
                   <c15:dlblFieldTable/>
                   <c15:xForSave val="1"/>
                   <c15:showDataLabelsRange val="1"/>
@@ -2585,12 +2610,13 @@
             </c:dLbl>
             <c:dLbl>
               <c:idx val="5"/>
+              <c:layout/>
               <c:tx>
                 <c:rich>
                   <a:bodyPr/>
                   <a:lstStyle/>
                   <a:p>
-                    <a:fld id="{F504C882-26B4-40D3-9372-4EF22B8FE5E3}" type="CELLRANGE">
+                    <a:fld id="{F9FF809C-8E9B-413C-AA3E-0C0B4ABAA8C0}" type="CELLRANGE">
                       <a:rPr lang="en-GB"/>
                       <a:pPr/>
                       <a:t>[CELLRANGE]</a:t>
@@ -2608,6 +2634,7 @@
               <c:showBubbleSize val="0"/>
               <c:extLst>
                 <c:ext xmlns:c15="http://schemas.microsoft.com/office/drawing/2012/chart" uri="{CE6537A1-D6FC-4f65-9D91-7224C49458BB}">
+                  <c15:layout/>
                   <c15:dlblFieldTable/>
                   <c15:xForSave val="1"/>
                   <c15:showDataLabelsRange val="1"/>
@@ -2653,6 +2680,7 @@
             <c:showLeaderLines val="0"/>
             <c:extLst>
               <c:ext xmlns:c15="http://schemas.microsoft.com/office/drawing/2012/chart" uri="{CE6537A1-D6FC-4f65-9D91-7224C49458BB}">
+                <c15:layout/>
                 <c15:showDataLabelsRange val="1"/>
                 <c15:showLeaderLines val="0"/>
               </c:ext>
@@ -2738,11 +2766,11 @@
           <c:showPercent val="0"/>
           <c:showBubbleSize val="0"/>
         </c:dLbls>
-        <c:axId val="387137104"/>
-        <c:axId val="387137496"/>
+        <c:axId val="384170488"/>
+        <c:axId val="384170880"/>
       </c:scatterChart>
       <c:catAx>
-        <c:axId val="387137104"/>
+        <c:axId val="384170488"/>
         <c:scaling>
           <c:orientation val="minMax"/>
         </c:scaling>
@@ -2785,7 +2813,7 @@
             <a:endParaRPr lang="en-US"/>
           </a:p>
         </c:txPr>
-        <c:crossAx val="387137496"/>
+        <c:crossAx val="384170880"/>
         <c:crosses val="autoZero"/>
         <c:auto val="1"/>
         <c:lblAlgn val="ctr"/>
@@ -2793,7 +2821,7 @@
         <c:noMultiLvlLbl val="0"/>
       </c:catAx>
       <c:valAx>
-        <c:axId val="387137496"/>
+        <c:axId val="384170880"/>
         <c:scaling>
           <c:orientation val="minMax"/>
         </c:scaling>
@@ -2844,7 +2872,7 @@
             <a:endParaRPr lang="en-US"/>
           </a:p>
         </c:txPr>
-        <c:crossAx val="387137104"/>
+        <c:crossAx val="384170488"/>
         <c:crosses val="autoZero"/>
         <c:crossBetween val="between"/>
       </c:valAx>
@@ -3010,6 +3038,7 @@
             <c:showLeaderLines val="0"/>
             <c:extLst>
               <c:ext xmlns:c15="http://schemas.microsoft.com/office/drawing/2012/chart" uri="{CE6537A1-D6FC-4f65-9D91-7224C49458BB}">
+                <c15:layout/>
                 <c15:showLeaderLines val="1"/>
                 <c15:leaderLines>
                   <c:spPr>
@@ -3250,6 +3279,7 @@
             <c:showLeaderLines val="0"/>
             <c:extLst>
               <c:ext xmlns:c15="http://schemas.microsoft.com/office/drawing/2012/chart" uri="{CE6537A1-D6FC-4f65-9D91-7224C49458BB}">
+                <c15:layout/>
                 <c15:showLeaderLines val="1"/>
                 <c15:leaderLines>
                   <c:spPr>
@@ -3466,6 +3496,7 @@
             <c:showLeaderLines val="0"/>
             <c:extLst>
               <c:ext xmlns:c15="http://schemas.microsoft.com/office/drawing/2012/chart" uri="{CE6537A1-D6FC-4f65-9D91-7224C49458BB}">
+                <c15:layout/>
                 <c15:showLeaderLines val="1"/>
                 <c15:leaderLines>
                   <c:spPr>
@@ -3652,6 +3683,7 @@
             <c:showLeaderLines val="0"/>
             <c:extLst>
               <c:ext xmlns:c15="http://schemas.microsoft.com/office/drawing/2012/chart" uri="{CE6537A1-D6FC-4f65-9D91-7224C49458BB}">
+                <c15:layout/>
                 <c15:showLeaderLines val="1"/>
                 <c15:leaderLines>
                   <c:spPr>
@@ -3883,6 +3915,7 @@
             <c:showLeaderLines val="0"/>
             <c:extLst>
               <c:ext xmlns:c15="http://schemas.microsoft.com/office/drawing/2012/chart" uri="{CE6537A1-D6FC-4f65-9D91-7224C49458BB}">
+                <c15:layout/>
                 <c15:showLeaderLines val="1"/>
                 <c15:leaderLines>
                   <c:spPr>
@@ -4108,6 +4141,7 @@
             <c:showLeaderLines val="0"/>
             <c:extLst>
               <c:ext xmlns:c15="http://schemas.microsoft.com/office/drawing/2012/chart" uri="{CE6537A1-D6FC-4f65-9D91-7224C49458BB}">
+                <c15:layout/>
                 <c15:showLeaderLines val="1"/>
                 <c15:leaderLines>
                   <c:spPr>
@@ -4265,11 +4299,11 @@
         </c:dLbls>
         <c:gapWidth val="150"/>
         <c:overlap val="100"/>
-        <c:axId val="240425432"/>
-        <c:axId val="240425824"/>
+        <c:axId val="383606024"/>
+        <c:axId val="383606416"/>
       </c:barChart>
       <c:catAx>
-        <c:axId val="240425432"/>
+        <c:axId val="383606024"/>
         <c:scaling>
           <c:orientation val="minMax"/>
         </c:scaling>
@@ -4312,7 +4346,7 @@
             <a:endParaRPr lang="en-US"/>
           </a:p>
         </c:txPr>
-        <c:crossAx val="240425824"/>
+        <c:crossAx val="383606416"/>
         <c:crosses val="autoZero"/>
         <c:auto val="1"/>
         <c:lblAlgn val="ctr"/>
@@ -4320,7 +4354,7 @@
         <c:noMultiLvlLbl val="0"/>
       </c:catAx>
       <c:valAx>
-        <c:axId val="240425824"/>
+        <c:axId val="383606416"/>
         <c:scaling>
           <c:orientation val="minMax"/>
         </c:scaling>
@@ -4371,7 +4405,7 @@
             <a:endParaRPr lang="en-US"/>
           </a:p>
         </c:txPr>
-        <c:crossAx val="240425432"/>
+        <c:crossAx val="383606024"/>
         <c:crosses val="autoZero"/>
         <c:crossBetween val="between"/>
       </c:valAx>
@@ -4385,6 +4419,7 @@
     </c:plotArea>
     <c:legend>
       <c:legendPos val="b"/>
+      <c:layout/>
       <c:overlay val="0"/>
       <c:spPr>
         <a:noFill/>
@@ -4526,6 +4561,7 @@
             <c:showLeaderLines val="0"/>
             <c:extLst>
               <c:ext xmlns:c15="http://schemas.microsoft.com/office/drawing/2012/chart" uri="{CE6537A1-D6FC-4f65-9D91-7224C49458BB}">
+                <c15:layout/>
                 <c15:showLeaderLines val="1"/>
                 <c15:leaderLines>
                   <c:spPr>
@@ -4757,6 +4793,7 @@
             <c:showLeaderLines val="0"/>
             <c:extLst>
               <c:ext xmlns:c15="http://schemas.microsoft.com/office/drawing/2012/chart" uri="{CE6537A1-D6FC-4f65-9D91-7224C49458BB}">
+                <c15:layout/>
                 <c15:showLeaderLines val="1"/>
                 <c15:leaderLines>
                   <c:spPr>
@@ -4964,6 +5001,7 @@
             <c:showLeaderLines val="0"/>
             <c:extLst>
               <c:ext xmlns:c15="http://schemas.microsoft.com/office/drawing/2012/chart" uri="{CE6537A1-D6FC-4f65-9D91-7224C49458BB}">
+                <c15:layout/>
                 <c15:showLeaderLines val="1"/>
                 <c15:leaderLines>
                   <c:spPr>
@@ -5141,6 +5179,7 @@
             <c:showLeaderLines val="0"/>
             <c:extLst>
               <c:ext xmlns:c15="http://schemas.microsoft.com/office/drawing/2012/chart" uri="{CE6537A1-D6FC-4f65-9D91-7224C49458BB}">
+                <c15:layout/>
                 <c15:showLeaderLines val="1"/>
                 <c15:leaderLines>
                   <c:spPr>
@@ -5369,6 +5408,7 @@
             <c:showLeaderLines val="0"/>
             <c:extLst>
               <c:ext xmlns:c15="http://schemas.microsoft.com/office/drawing/2012/chart" uri="{CE6537A1-D6FC-4f65-9D91-7224C49458BB}">
+                <c15:layout/>
                 <c15:showLeaderLines val="1"/>
                 <c15:leaderLines>
                   <c:spPr>
@@ -5555,6 +5595,7 @@
             <c:showLeaderLines val="0"/>
             <c:extLst>
               <c:ext xmlns:c15="http://schemas.microsoft.com/office/drawing/2012/chart" uri="{CE6537A1-D6FC-4f65-9D91-7224C49458BB}">
+                <c15:layout/>
                 <c15:showLeaderLines val="1"/>
                 <c15:leaderLines>
                   <c:spPr>
@@ -5709,11 +5750,11 @@
         </c:dLbls>
         <c:gapWidth val="150"/>
         <c:overlap val="100"/>
-        <c:axId val="386512016"/>
-        <c:axId val="386512408"/>
+        <c:axId val="378351656"/>
+        <c:axId val="378352048"/>
       </c:barChart>
       <c:catAx>
-        <c:axId val="386512016"/>
+        <c:axId val="378351656"/>
         <c:scaling>
           <c:orientation val="minMax"/>
         </c:scaling>
@@ -5756,7 +5797,7 @@
             <a:endParaRPr lang="en-US"/>
           </a:p>
         </c:txPr>
-        <c:crossAx val="386512408"/>
+        <c:crossAx val="378352048"/>
         <c:crosses val="autoZero"/>
         <c:auto val="1"/>
         <c:lblAlgn val="ctr"/>
@@ -5764,7 +5805,7 @@
         <c:noMultiLvlLbl val="0"/>
       </c:catAx>
       <c:valAx>
-        <c:axId val="386512408"/>
+        <c:axId val="378352048"/>
         <c:scaling>
           <c:orientation val="minMax"/>
         </c:scaling>
@@ -5815,7 +5856,7 @@
             <a:endParaRPr lang="en-US"/>
           </a:p>
         </c:txPr>
-        <c:crossAx val="386512016"/>
+        <c:crossAx val="378351656"/>
         <c:crosses val="autoZero"/>
         <c:crossBetween val="between"/>
       </c:valAx>
@@ -5829,6 +5870,7 @@
     </c:plotArea>
     <c:legend>
       <c:legendPos val="b"/>
+      <c:layout/>
       <c:overlay val="0"/>
       <c:spPr>
         <a:noFill/>
@@ -5970,6 +6012,7 @@
             <c:showLeaderLines val="0"/>
             <c:extLst>
               <c:ext xmlns:c15="http://schemas.microsoft.com/office/drawing/2012/chart" uri="{CE6537A1-D6FC-4f65-9D91-7224C49458BB}">
+                <c15:layout/>
                 <c15:showLeaderLines val="1"/>
                 <c15:leaderLines>
                   <c:spPr>
@@ -6201,6 +6244,7 @@
             <c:showLeaderLines val="0"/>
             <c:extLst>
               <c:ext xmlns:c15="http://schemas.microsoft.com/office/drawing/2012/chart" uri="{CE6537A1-D6FC-4f65-9D91-7224C49458BB}">
+                <c15:layout/>
                 <c15:showLeaderLines val="1"/>
                 <c15:leaderLines>
                   <c:spPr>
@@ -6408,6 +6452,7 @@
             <c:showLeaderLines val="0"/>
             <c:extLst>
               <c:ext xmlns:c15="http://schemas.microsoft.com/office/drawing/2012/chart" uri="{CE6537A1-D6FC-4f65-9D91-7224C49458BB}">
+                <c15:layout/>
                 <c15:showLeaderLines val="1"/>
                 <c15:leaderLines>
                   <c:spPr>
@@ -6585,6 +6630,7 @@
             <c:showLeaderLines val="0"/>
             <c:extLst>
               <c:ext xmlns:c15="http://schemas.microsoft.com/office/drawing/2012/chart" uri="{CE6537A1-D6FC-4f65-9D91-7224C49458BB}">
+                <c15:layout/>
                 <c15:showLeaderLines val="1"/>
                 <c15:leaderLines>
                   <c:spPr>
@@ -6813,6 +6859,7 @@
             <c:showLeaderLines val="0"/>
             <c:extLst>
               <c:ext xmlns:c15="http://schemas.microsoft.com/office/drawing/2012/chart" uri="{CE6537A1-D6FC-4f65-9D91-7224C49458BB}">
+                <c15:layout/>
                 <c15:showLeaderLines val="1"/>
                 <c15:leaderLines>
                   <c:spPr>
@@ -6999,6 +7046,7 @@
             <c:showLeaderLines val="0"/>
             <c:extLst>
               <c:ext xmlns:c15="http://schemas.microsoft.com/office/drawing/2012/chart" uri="{CE6537A1-D6FC-4f65-9D91-7224C49458BB}">
+                <c15:layout/>
                 <c15:showLeaderLines val="1"/>
                 <c15:leaderLines>
                   <c:spPr>
@@ -7152,11 +7200,11 @@
           <c:showBubbleSize val="0"/>
         </c:dLbls>
         <c:gapWidth val="0"/>
-        <c:axId val="380693864"/>
-        <c:axId val="380728008"/>
+        <c:axId val="383256040"/>
+        <c:axId val="384086816"/>
       </c:barChart>
       <c:catAx>
-        <c:axId val="380693864"/>
+        <c:axId val="383256040"/>
         <c:scaling>
           <c:orientation val="minMax"/>
         </c:scaling>
@@ -7199,7 +7247,7 @@
             <a:endParaRPr lang="en-US"/>
           </a:p>
         </c:txPr>
-        <c:crossAx val="380728008"/>
+        <c:crossAx val="384086816"/>
         <c:crosses val="autoZero"/>
         <c:auto val="1"/>
         <c:lblAlgn val="ctr"/>
@@ -7207,7 +7255,7 @@
         <c:noMultiLvlLbl val="0"/>
       </c:catAx>
       <c:valAx>
-        <c:axId val="380728008"/>
+        <c:axId val="384086816"/>
         <c:scaling>
           <c:orientation val="minMax"/>
         </c:scaling>
@@ -7258,7 +7306,7 @@
             <a:endParaRPr lang="en-US"/>
           </a:p>
         </c:txPr>
-        <c:crossAx val="380693864"/>
+        <c:crossAx val="383256040"/>
         <c:crosses val="autoZero"/>
         <c:crossBetween val="between"/>
       </c:valAx>
@@ -7272,6 +7320,7 @@
     </c:plotArea>
     <c:legend>
       <c:legendPos val="b"/>
+      <c:layout/>
       <c:overlay val="0"/>
       <c:spPr>
         <a:noFill/>
@@ -12456,7 +12505,7 @@
           <a:p>
             <a:fld id="{B25CA3F7-CF41-46F1-805A-C98D626DCCC9}" type="datetimeFigureOut">
               <a:rPr lang="en-GB" smtClean="0"/>
-              <a:t>19/11/2015</a:t>
+              <a:t>23/11/2015</a:t>
             </a:fld>
             <a:endParaRPr lang="en-GB"/>
           </a:p>
@@ -12621,7 +12670,7 @@
           <a:p>
             <a:fld id="{B02AC319-36A1-4F69-B684-7F2B98CF490A}" type="datetimeFigureOut">
               <a:rPr lang="en-GB" smtClean="0"/>
-              <a:t>19/11/2015</a:t>
+              <a:t>23/11/2015</a:t>
             </a:fld>
             <a:endParaRPr lang="en-GB"/>
           </a:p>
@@ -14497,60 +14546,6 @@
           </a:p>
         </p:txBody>
       </p:sp>
-      <p:pic>
-        <p:nvPicPr>
-          <p:cNvPr id="10" name="Picture 9" descr="JLR_L_RS"/>
-          <p:cNvPicPr>
-            <a:picLocks noChangeAspect="1" noChangeArrowheads="1"/>
-          </p:cNvPicPr>
-          <p:nvPr userDrawn="1"/>
-        </p:nvPicPr>
-        <p:blipFill>
-          <a:blip r:embed="rId5" cstate="screen">
-            <a:extLst>
-              <a:ext uri="{28A0092B-C50C-407E-A947-70E740481C1C}">
-                <a14:useLocalDpi xmlns:a14="http://schemas.microsoft.com/office/drawing/2010/main" val="0"/>
-              </a:ext>
-            </a:extLst>
-          </a:blip>
-          <a:srcRect/>
-          <a:stretch>
-            <a:fillRect/>
-          </a:stretch>
-        </p:blipFill>
-        <p:spPr bwMode="auto">
-          <a:xfrm>
-            <a:off x="6732240" y="167029"/>
-            <a:ext cx="2266950" cy="679450"/>
-          </a:xfrm>
-          <a:prstGeom prst="rect">
-            <a:avLst/>
-          </a:prstGeom>
-          <a:noFill/>
-          <a:ln>
-            <a:noFill/>
-          </a:ln>
-          <a:extLst>
-            <a:ext uri="{909E8E84-426E-40DD-AFC4-6F175D3DCCD1}">
-              <a14:hiddenFill xmlns:a14="http://schemas.microsoft.com/office/drawing/2010/main">
-                <a:solidFill>
-                  <a:srgbClr val="FFFFFF"/>
-                </a:solidFill>
-              </a14:hiddenFill>
-            </a:ext>
-            <a:ext uri="{91240B29-F687-4F45-9708-019B960494DF}">
-              <a14:hiddenLine xmlns:a14="http://schemas.microsoft.com/office/drawing/2010/main" w="9525">
-                <a:solidFill>
-                  <a:srgbClr val="000000"/>
-                </a:solidFill>
-                <a:miter lim="800000"/>
-                <a:headEnd/>
-                <a:tailEnd/>
-              </a14:hiddenLine>
-            </a:ext>
-          </a:extLst>
-        </p:spPr>
-      </p:pic>
       <p:sp>
         <p:nvSpPr>
           <p:cNvPr id="11" name="Line 7"/>
@@ -14653,6 +14648,36 @@
           </a:p>
         </p:txBody>
       </p:sp>
+      <p:pic>
+        <p:nvPicPr>
+          <p:cNvPr id="2" name="Picture 1"/>
+          <p:cNvPicPr>
+            <a:picLocks noChangeAspect="1"/>
+          </p:cNvPicPr>
+          <p:nvPr userDrawn="1"/>
+        </p:nvPicPr>
+        <p:blipFill>
+          <a:blip r:embed="rId5" cstate="print">
+            <a:extLst>
+              <a:ext uri="{28A0092B-C50C-407E-A947-70E740481C1C}">
+                <a14:useLocalDpi xmlns:a14="http://schemas.microsoft.com/office/drawing/2010/main" val="0"/>
+              </a:ext>
+            </a:extLst>
+          </a:blip>
+          <a:stretch>
+            <a:fillRect/>
+          </a:stretch>
+        </p:blipFill>
+        <p:spPr>
+          <a:xfrm>
+            <a:off x="6507626" y="0"/>
+            <a:ext cx="2636374" cy="1050584"/>
+          </a:xfrm>
+          <a:prstGeom prst="rect">
+            <a:avLst/>
+          </a:prstGeom>
+        </p:spPr>
+      </p:pic>
     </p:spTree>
     <p:extLst>
       <p:ext uri="{BB962C8B-B14F-4D97-AF65-F5344CB8AC3E}">

</xml_diff>